<commit_message>
Final commit to mini project
</commit_message>
<xml_diff>
--- a/Documents/PPT.pptx
+++ b/Documents/PPT.pptx
@@ -318,7 +318,7 @@
           <a:p>
             <a:fld id="{4AAD347D-5ACD-4C99-B74B-A9C85AD731AF}" type="datetimeFigureOut">
               <a:rPr lang="en-US" dirty="0"/>
-              <a:t>3/5/2021</a:t>
+              <a:t>3/22/2021</a:t>
             </a:fld>
             <a:endParaRPr lang="en-US" dirty="0"/>
           </a:p>
@@ -588,7 +588,7 @@
           <a:p>
             <a:fld id="{4509A250-FF31-4206-8172-F9D3106AACB1}" type="datetimeFigureOut">
               <a:rPr lang="en-US" dirty="0"/>
-              <a:t>3/5/2021</a:t>
+              <a:t>3/22/2021</a:t>
             </a:fld>
             <a:endParaRPr lang="en-US" dirty="0"/>
           </a:p>
@@ -781,7 +781,7 @@
           <a:p>
             <a:fld id="{4509A250-FF31-4206-8172-F9D3106AACB1}" type="datetimeFigureOut">
               <a:rPr lang="en-US" dirty="0"/>
-              <a:t>3/5/2021</a:t>
+              <a:t>3/22/2021</a:t>
             </a:fld>
             <a:endParaRPr lang="en-US" dirty="0"/>
           </a:p>
@@ -1051,7 +1051,7 @@
           <a:p>
             <a:fld id="{4509A250-FF31-4206-8172-F9D3106AACB1}" type="datetimeFigureOut">
               <a:rPr lang="en-US" dirty="0"/>
-              <a:t>3/5/2021</a:t>
+              <a:t>3/22/2021</a:t>
             </a:fld>
             <a:endParaRPr lang="en-US" dirty="0"/>
           </a:p>
@@ -1377,7 +1377,7 @@
           <a:p>
             <a:fld id="{4509A250-FF31-4206-8172-F9D3106AACB1}" type="datetimeFigureOut">
               <a:rPr lang="en-US" dirty="0"/>
-              <a:t>3/5/2021</a:t>
+              <a:t>3/22/2021</a:t>
             </a:fld>
             <a:endParaRPr lang="en-US" dirty="0"/>
           </a:p>
@@ -1995,7 +1995,7 @@
           <a:p>
             <a:fld id="{4509A250-FF31-4206-8172-F9D3106AACB1}" type="datetimeFigureOut">
               <a:rPr lang="en-US" dirty="0"/>
-              <a:t>3/5/2021</a:t>
+              <a:t>3/22/2021</a:t>
             </a:fld>
             <a:endParaRPr lang="en-US" dirty="0"/>
           </a:p>
@@ -2829,7 +2829,7 @@
           <a:p>
             <a:fld id="{4509A250-FF31-4206-8172-F9D3106AACB1}" type="datetimeFigureOut">
               <a:rPr lang="en-US" dirty="0"/>
-              <a:t>3/5/2021</a:t>
+              <a:t>3/22/2021</a:t>
             </a:fld>
             <a:endParaRPr lang="en-US" dirty="0"/>
           </a:p>
@@ -2997,7 +2997,7 @@
           <a:p>
             <a:fld id="{4509A250-FF31-4206-8172-F9D3106AACB1}" type="datetimeFigureOut">
               <a:rPr lang="en-US" dirty="0"/>
-              <a:t>3/5/2021</a:t>
+              <a:t>3/22/2021</a:t>
             </a:fld>
             <a:endParaRPr lang="en-US" dirty="0"/>
           </a:p>
@@ -3175,7 +3175,7 @@
           <a:p>
             <a:fld id="{4509A250-FF31-4206-8172-F9D3106AACB1}" type="datetimeFigureOut">
               <a:rPr lang="en-US" dirty="0"/>
-              <a:t>3/5/2021</a:t>
+              <a:t>3/22/2021</a:t>
             </a:fld>
             <a:endParaRPr lang="en-US" dirty="0"/>
           </a:p>
@@ -3343,7 +3343,7 @@
           <a:p>
             <a:fld id="{9796027F-7875-4030-9381-8BD8C4F21935}" type="datetimeFigureOut">
               <a:rPr lang="en-US" dirty="0"/>
-              <a:t>3/5/2021</a:t>
+              <a:t>3/22/2021</a:t>
             </a:fld>
             <a:endParaRPr lang="en-US" dirty="0"/>
           </a:p>
@@ -3589,7 +3589,7 @@
           <a:p>
             <a:fld id="{9796027F-7875-4030-9381-8BD8C4F21935}" type="datetimeFigureOut">
               <a:rPr lang="en-US" dirty="0"/>
-              <a:t>3/5/2021</a:t>
+              <a:t>3/22/2021</a:t>
             </a:fld>
             <a:endParaRPr lang="en-US" dirty="0"/>
           </a:p>
@@ -3878,7 +3878,7 @@
           <a:p>
             <a:fld id="{9796027F-7875-4030-9381-8BD8C4F21935}" type="datetimeFigureOut">
               <a:rPr lang="en-US" dirty="0"/>
-              <a:t>3/5/2021</a:t>
+              <a:t>3/22/2021</a:t>
             </a:fld>
             <a:endParaRPr lang="en-US" dirty="0"/>
           </a:p>
@@ -4319,7 +4319,7 @@
           <a:p>
             <a:fld id="{9796027F-7875-4030-9381-8BD8C4F21935}" type="datetimeFigureOut">
               <a:rPr lang="en-US" dirty="0"/>
-              <a:t>3/5/2021</a:t>
+              <a:t>3/22/2021</a:t>
             </a:fld>
             <a:endParaRPr lang="en-US" dirty="0"/>
           </a:p>
@@ -4436,7 +4436,7 @@
           <a:p>
             <a:fld id="{4509A250-FF31-4206-8172-F9D3106AACB1}" type="datetimeFigureOut">
               <a:rPr lang="en-US" dirty="0"/>
-              <a:t>3/5/2021</a:t>
+              <a:t>3/22/2021</a:t>
             </a:fld>
             <a:endParaRPr lang="en-US" dirty="0"/>
           </a:p>
@@ -4531,7 +4531,7 @@
           <a:p>
             <a:fld id="{4509A250-FF31-4206-8172-F9D3106AACB1}" type="datetimeFigureOut">
               <a:rPr lang="en-US" dirty="0"/>
-              <a:t>3/5/2021</a:t>
+              <a:t>3/22/2021</a:t>
             </a:fld>
             <a:endParaRPr lang="en-US" dirty="0"/>
           </a:p>
@@ -4808,7 +4808,7 @@
           <a:p>
             <a:fld id="{4509A250-FF31-4206-8172-F9D3106AACB1}" type="datetimeFigureOut">
               <a:rPr lang="en-US" dirty="0"/>
-              <a:t>3/5/2021</a:t>
+              <a:t>3/22/2021</a:t>
             </a:fld>
             <a:endParaRPr lang="en-US" dirty="0"/>
           </a:p>
@@ -5078,7 +5078,7 @@
           <a:p>
             <a:fld id="{4509A250-FF31-4206-8172-F9D3106AACB1}" type="datetimeFigureOut">
               <a:rPr lang="en-US" dirty="0"/>
-              <a:t>3/5/2021</a:t>
+              <a:t>3/22/2021</a:t>
             </a:fld>
             <a:endParaRPr lang="en-US" dirty="0"/>
           </a:p>
@@ -5499,7 +5499,7 @@
           <a:p>
             <a:fld id="{4AAD347D-5ACD-4C99-B74B-A9C85AD731AF}" type="datetimeFigureOut">
               <a:rPr lang="en-US" dirty="0"/>
-              <a:t>3/5/2021</a:t>
+              <a:t>3/22/2021</a:t>
             </a:fld>
             <a:endParaRPr lang="en-US" dirty="0"/>
           </a:p>
@@ -6078,7 +6078,7 @@
                 <a:latin typeface="Segoe UI"/>
                 <a:cs typeface="Segoe UI"/>
               </a:rPr>
-              <a:t>CHATBOT</a:t>
+              <a:t>COLLEGE CHATBOT</a:t>
             </a:r>
             <a:endParaRPr lang="en-US" dirty="0">
               <a:solidFill>
@@ -8476,10 +8476,9 @@
           </a:p>
           <a:p>
             <a:r>
-              <a:rPr lang="en-GB" dirty="0" err="1"/>
-              <a:t>ChatterBot</a:t>
-            </a:r>
-            <a:endParaRPr lang="en-GB" dirty="0"/>
+              <a:rPr lang="en-GB" dirty="0"/>
+              <a:t>Chatterbot</a:t>
+            </a:r>
           </a:p>
           <a:p>
             <a:r>
@@ -8495,10 +8494,9 @@
           </a:p>
           <a:p>
             <a:r>
-              <a:rPr lang="en-GB" dirty="0" err="1"/>
+              <a:rPr lang="en-GB" dirty="0"/>
               <a:t>Thinc</a:t>
             </a:r>
-            <a:endParaRPr lang="en-GB" dirty="0"/>
           </a:p>
         </p:txBody>
       </p:sp>

</xml_diff>